<commit_message>
Review Exam 1 slides updated
</commit_message>
<xml_diff>
--- a/slides/On-Campus/04_02_ReviewSessionFormattingObjects_Fall2023.pptx
+++ b/slides/On-Campus/04_02_ReviewSessionFormattingObjects_Fall2023.pptx
@@ -137,6 +137,30 @@
 
 <file path=ppt/changesInfos/changesInfo1.xml><?xml version="1.0" encoding="utf-8"?>
 <pc:chgInfo xmlns:a="http://schemas.openxmlformats.org/drawingml/2006/main" xmlns:r="http://schemas.openxmlformats.org/officeDocument/2006/relationships" xmlns:ac="http://schemas.microsoft.com/office/drawing/2013/main/command" xmlns:pc="http://schemas.microsoft.com/office/powerpoint/2013/main/command">
+  <pc:docChgLst>
+    <pc:chgData name="Marcia Moraes" userId="c9c67e8a-58e2-4733-9a1c-5d44fec4775b" providerId="ADAL" clId="{8BDF9E1B-4842-48BE-A91D-B735B703A2DE}"/>
+    <pc:docChg chg="modSld">
+      <pc:chgData name="Marcia Moraes" userId="c9c67e8a-58e2-4733-9a1c-5d44fec4775b" providerId="ADAL" clId="{8BDF9E1B-4842-48BE-A91D-B735B703A2DE}" dt="2023-09-13T21:50:04.110" v="7" actId="20577"/>
+      <pc:docMkLst>
+        <pc:docMk/>
+      </pc:docMkLst>
+      <pc:sldChg chg="modSp">
+        <pc:chgData name="Marcia Moraes" userId="c9c67e8a-58e2-4733-9a1c-5d44fec4775b" providerId="ADAL" clId="{8BDF9E1B-4842-48BE-A91D-B735B703A2DE}" dt="2023-09-13T21:50:04.110" v="7" actId="20577"/>
+        <pc:sldMkLst>
+          <pc:docMk/>
+          <pc:sldMk cId="2881875054" sldId="274"/>
+        </pc:sldMkLst>
+        <pc:spChg chg="mod">
+          <ac:chgData name="Marcia Moraes" userId="c9c67e8a-58e2-4733-9a1c-5d44fec4775b" providerId="ADAL" clId="{8BDF9E1B-4842-48BE-A91D-B735B703A2DE}" dt="2023-09-13T21:50:04.110" v="7" actId="20577"/>
+          <ac:spMkLst>
+            <pc:docMk/>
+            <pc:sldMk cId="2881875054" sldId="274"/>
+            <ac:spMk id="6" creationId="{00000000-0000-0000-0000-000000000000}"/>
+          </ac:spMkLst>
+        </pc:spChg>
+      </pc:sldChg>
+    </pc:docChg>
+  </pc:docChgLst>
   <pc:docChgLst>
     <pc:chgData name="Marcia Moraes" userId="c9c67e8a-58e2-4733-9a1c-5d44fec4775b" providerId="ADAL" clId="{20928896-E6FC-4961-B5E2-21BC2BAB77F5}"/>
     <pc:docChg chg="custSel modSld">
@@ -7402,7 +7426,7 @@
                 <a:latin typeface="Consolas" panose="020B0609020204030204" pitchFamily="49" charset="0"/>
                 <a:cs typeface="Consolas" panose="020B0609020204030204" pitchFamily="49" charset="0"/>
               </a:rPr>
-              <a:t>int</a:t>
+              <a:t>double</a:t>
             </a:r>
             <a:r>
               <a:rPr lang="en-US" b="1" dirty="0">
@@ -7474,7 +7498,7 @@
                 <a:latin typeface="Consolas" panose="020B0609020204030204" pitchFamily="49" charset="0"/>
                 <a:cs typeface="Consolas" panose="020B0609020204030204" pitchFamily="49" charset="0"/>
               </a:rPr>
-              <a:t>(“Width: %s\n”, width);</a:t>
+              <a:t>(“Width: %d\n”, width);</a:t>
             </a:r>
           </a:p>
           <a:p>
@@ -9967,23 +9991,6 @@
 </file>
 
 <file path=customXml/item1.xml><?xml version="1.0" encoding="utf-8"?>
-<?mso-contentType ?>
-<FormTemplates xmlns="http://schemas.microsoft.com/sharepoint/v3/contenttype/forms">
-  <Display>DocumentLibraryForm</Display>
-  <Edit>DocumentLibraryForm</Edit>
-  <New>DocumentLibraryForm</New>
-</FormTemplates>
-</file>
-
-<file path=customXml/item2.xml><?xml version="1.0" encoding="utf-8"?>
-<p:properties xmlns:p="http://schemas.microsoft.com/office/2006/metadata/properties" xmlns:xsi="http://www.w3.org/2001/XMLSchema-instance" xmlns:pc="http://schemas.microsoft.com/office/infopath/2007/PartnerControls">
-  <documentManagement>
-    <_activity xmlns="92c41bee-f0ee-4aa6-9399-a35fbb883510" xsi:nil="true"/>
-  </documentManagement>
-</p:properties>
-</file>
-
-<file path=customXml/item3.xml><?xml version="1.0" encoding="utf-8"?>
 <ct:contentTypeSchema xmlns:ct="http://schemas.microsoft.com/office/2006/metadata/contentType" xmlns:ma="http://schemas.microsoft.com/office/2006/metadata/properties/metaAttributes" ct:_="" ma:_="" ma:contentTypeName="Document" ma:contentTypeID="0x010100074387D78AC76C4289401EF66FB51FCC" ma:contentTypeVersion="16" ma:contentTypeDescription="Create a new document." ma:contentTypeScope="" ma:versionID="8a6cbedf0fa50d039049f798424873e6">
   <xsd:schema xmlns:xsd="http://www.w3.org/2001/XMLSchema" xmlns:xs="http://www.w3.org/2001/XMLSchema" xmlns:p="http://schemas.microsoft.com/office/2006/metadata/properties" xmlns:ns3="92c41bee-f0ee-4aa6-9399-a35fbb883510" xmlns:ns4="e06ed288-fd75-4b50-bbed-f5a5df88c31c" targetNamespace="http://schemas.microsoft.com/office/2006/metadata/properties" ma:root="true" ma:fieldsID="8308f6b0971d5393350c61f7dc4d29b0" ns3:_="" ns4:_="">
     <xsd:import namespace="92c41bee-f0ee-4aa6-9399-a35fbb883510"/>
@@ -10224,32 +10231,24 @@
 </ct:contentTypeSchema>
 </file>
 
-<file path=customXml/itemProps1.xml><?xml version="1.0" encoding="utf-8"?>
-<ds:datastoreItem xmlns:ds="http://schemas.openxmlformats.org/officeDocument/2006/customXml" ds:itemID="{859D3A98-3522-4EE5-94F5-88815D34F733}">
-  <ds:schemaRefs>
-    <ds:schemaRef ds:uri="http://schemas.microsoft.com/sharepoint/v3/contenttype/forms"/>
-  </ds:schemaRefs>
-</ds:datastoreItem>
+<file path=customXml/item2.xml><?xml version="1.0" encoding="utf-8"?>
+<p:properties xmlns:p="http://schemas.microsoft.com/office/2006/metadata/properties" xmlns:xsi="http://www.w3.org/2001/XMLSchema-instance" xmlns:pc="http://schemas.microsoft.com/office/infopath/2007/PartnerControls">
+  <documentManagement>
+    <_activity xmlns="92c41bee-f0ee-4aa6-9399-a35fbb883510" xsi:nil="true"/>
+  </documentManagement>
+</p:properties>
 </file>
 
-<file path=customXml/itemProps2.xml><?xml version="1.0" encoding="utf-8"?>
-<ds:datastoreItem xmlns:ds="http://schemas.openxmlformats.org/officeDocument/2006/customXml" ds:itemID="{E7B4BED8-6587-430C-8C6E-C226A7D33E25}">
-  <ds:schemaRefs>
-    <ds:schemaRef ds:uri="http://purl.org/dc/elements/1.1/"/>
-    <ds:schemaRef ds:uri="92c41bee-f0ee-4aa6-9399-a35fbb883510"/>
-    <ds:schemaRef ds:uri="http://schemas.openxmlformats.org/package/2006/metadata/core-properties"/>
-    <ds:schemaRef ds:uri="http://schemas.microsoft.com/office/2006/metadata/properties"/>
-    <ds:schemaRef ds:uri="http://schemas.microsoft.com/office/infopath/2007/PartnerControls"/>
-    <ds:schemaRef ds:uri="http://schemas.microsoft.com/office/2006/documentManagement/types"/>
-    <ds:schemaRef ds:uri="http://www.w3.org/XML/1998/namespace"/>
-    <ds:schemaRef ds:uri="e06ed288-fd75-4b50-bbed-f5a5df88c31c"/>
-    <ds:schemaRef ds:uri="http://purl.org/dc/dcmitype/"/>
-    <ds:schemaRef ds:uri="http://purl.org/dc/terms/"/>
-  </ds:schemaRefs>
-</ds:datastoreItem>
+<file path=customXml/item3.xml><?xml version="1.0" encoding="utf-8"?>
+<?mso-contentType ?>
+<FormTemplates xmlns="http://schemas.microsoft.com/sharepoint/v3/contenttype/forms">
+  <Display>DocumentLibraryForm</Display>
+  <Edit>DocumentLibraryForm</Edit>
+  <New>DocumentLibraryForm</New>
+</FormTemplates>
 </file>
 
-<file path=customXml/itemProps3.xml><?xml version="1.0" encoding="utf-8"?>
+<file path=customXml/itemProps1.xml><?xml version="1.0" encoding="utf-8"?>
 <ds:datastoreItem xmlns:ds="http://schemas.openxmlformats.org/officeDocument/2006/customXml" ds:itemID="{1BD8A2F5-6782-4898-9977-D853F7D9FE81}">
   <ds:schemaRefs>
     <ds:schemaRef ds:uri="http://schemas.microsoft.com/office/2006/metadata/contentType"/>
@@ -10266,4 +10265,29 @@
     <ds:schemaRef ds:uri="http://schemas.microsoft.com/internal/obd"/>
   </ds:schemaRefs>
 </ds:datastoreItem>
+</file>
+
+<file path=customXml/itemProps2.xml><?xml version="1.0" encoding="utf-8"?>
+<ds:datastoreItem xmlns:ds="http://schemas.openxmlformats.org/officeDocument/2006/customXml" ds:itemID="{E7B4BED8-6587-430C-8C6E-C226A7D33E25}">
+  <ds:schemaRefs>
+    <ds:schemaRef ds:uri="92c41bee-f0ee-4aa6-9399-a35fbb883510"/>
+    <ds:schemaRef ds:uri="http://www.w3.org/XML/1998/namespace"/>
+    <ds:schemaRef ds:uri="http://schemas.openxmlformats.org/package/2006/metadata/core-properties"/>
+    <ds:schemaRef ds:uri="http://purl.org/dc/terms/"/>
+    <ds:schemaRef ds:uri="http://schemas.microsoft.com/office/2006/documentManagement/types"/>
+    <ds:schemaRef ds:uri="http://purl.org/dc/dcmitype/"/>
+    <ds:schemaRef ds:uri="http://purl.org/dc/elements/1.1/"/>
+    <ds:schemaRef ds:uri="http://schemas.microsoft.com/office/2006/metadata/properties"/>
+    <ds:schemaRef ds:uri="http://schemas.microsoft.com/office/infopath/2007/PartnerControls"/>
+    <ds:schemaRef ds:uri="e06ed288-fd75-4b50-bbed-f5a5df88c31c"/>
+  </ds:schemaRefs>
+</ds:datastoreItem>
+</file>
+
+<file path=customXml/itemProps3.xml><?xml version="1.0" encoding="utf-8"?>
+<ds:datastoreItem xmlns:ds="http://schemas.openxmlformats.org/officeDocument/2006/customXml" ds:itemID="{859D3A98-3522-4EE5-94F5-88815D34F733}">
+  <ds:schemaRefs>
+    <ds:schemaRef ds:uri="http://schemas.microsoft.com/sharepoint/v3/contenttype/forms"/>
+  </ds:schemaRefs>
+</ds:datastoreItem>
 </file>
</xml_diff>